<commit_message>
Initial collab recommendation system
</commit_message>
<xml_diff>
--- a/Movie Recommendation Systems.pptx
+++ b/Movie Recommendation Systems.pptx
@@ -114,6 +114,11 @@
       </a:defRPr>
     </a:lvl9pPr>
   </p:defaultTextStyle>
+  <p:extLst>
+    <p:ext uri="{EFAFB233-063F-42B5-8137-9DF3F51BA10A}">
+      <p15:sldGuideLst xmlns:p15="http://schemas.microsoft.com/office/powerpoint/2012/main"/>
+    </p:ext>
+  </p:extLst>
 </p:presentation>
 </file>
 
@@ -399,7 +404,7 @@
           <a:p>
             <a:fld id="{12F13438-500E-4236-BBEA-EC67F23236E9}" type="datetimeFigureOut">
               <a:rPr lang="en-US" smtClean="0"/>
-              <a:t>11/29/2021</a:t>
+              <a:t>11/30/2021</a:t>
             </a:fld>
             <a:endParaRPr lang="en-US"/>
           </a:p>
@@ -597,7 +602,7 @@
           <a:p>
             <a:fld id="{12F13438-500E-4236-BBEA-EC67F23236E9}" type="datetimeFigureOut">
               <a:rPr lang="en-US" smtClean="0"/>
-              <a:t>11/29/2021</a:t>
+              <a:t>11/30/2021</a:t>
             </a:fld>
             <a:endParaRPr lang="en-US"/>
           </a:p>
@@ -805,7 +810,7 @@
           <a:p>
             <a:fld id="{12F13438-500E-4236-BBEA-EC67F23236E9}" type="datetimeFigureOut">
               <a:rPr lang="en-US" smtClean="0"/>
-              <a:t>11/29/2021</a:t>
+              <a:t>11/30/2021</a:t>
             </a:fld>
             <a:endParaRPr lang="en-US"/>
           </a:p>
@@ -1476,7 +1481,7 @@
           <a:p>
             <a:fld id="{12F13438-500E-4236-BBEA-EC67F23236E9}" type="datetimeFigureOut">
               <a:rPr lang="en-US" smtClean="0"/>
-              <a:t>11/29/2021</a:t>
+              <a:t>11/30/2021</a:t>
             </a:fld>
             <a:endParaRPr lang="en-US"/>
           </a:p>
@@ -1751,7 +1756,7 @@
           <a:p>
             <a:fld id="{12F13438-500E-4236-BBEA-EC67F23236E9}" type="datetimeFigureOut">
               <a:rPr lang="en-US" smtClean="0"/>
-              <a:t>11/29/2021</a:t>
+              <a:t>11/30/2021</a:t>
             </a:fld>
             <a:endParaRPr lang="en-US"/>
           </a:p>
@@ -2016,7 +2021,7 @@
           <a:p>
             <a:fld id="{12F13438-500E-4236-BBEA-EC67F23236E9}" type="datetimeFigureOut">
               <a:rPr lang="en-US" smtClean="0"/>
-              <a:t>11/29/2021</a:t>
+              <a:t>11/30/2021</a:t>
             </a:fld>
             <a:endParaRPr lang="en-US"/>
           </a:p>
@@ -2428,7 +2433,7 @@
           <a:p>
             <a:fld id="{12F13438-500E-4236-BBEA-EC67F23236E9}" type="datetimeFigureOut">
               <a:rPr lang="en-US" smtClean="0"/>
-              <a:t>11/29/2021</a:t>
+              <a:t>11/30/2021</a:t>
             </a:fld>
             <a:endParaRPr lang="en-US"/>
           </a:p>
@@ -2569,7 +2574,7 @@
           <a:p>
             <a:fld id="{12F13438-500E-4236-BBEA-EC67F23236E9}" type="datetimeFigureOut">
               <a:rPr lang="en-US" smtClean="0"/>
-              <a:t>11/29/2021</a:t>
+              <a:t>11/30/2021</a:t>
             </a:fld>
             <a:endParaRPr lang="en-US"/>
           </a:p>
@@ -2682,7 +2687,7 @@
           <a:p>
             <a:fld id="{12F13438-500E-4236-BBEA-EC67F23236E9}" type="datetimeFigureOut">
               <a:rPr lang="en-US" smtClean="0"/>
-              <a:t>11/29/2021</a:t>
+              <a:t>11/30/2021</a:t>
             </a:fld>
             <a:endParaRPr lang="en-US"/>
           </a:p>
@@ -2993,7 +2998,7 @@
           <a:p>
             <a:fld id="{12F13438-500E-4236-BBEA-EC67F23236E9}" type="datetimeFigureOut">
               <a:rPr lang="en-US" smtClean="0"/>
-              <a:t>11/29/2021</a:t>
+              <a:t>11/30/2021</a:t>
             </a:fld>
             <a:endParaRPr lang="en-US"/>
           </a:p>
@@ -3281,7 +3286,7 @@
           <a:p>
             <a:fld id="{12F13438-500E-4236-BBEA-EC67F23236E9}" type="datetimeFigureOut">
               <a:rPr lang="en-US" smtClean="0"/>
-              <a:t>11/29/2021</a:t>
+              <a:t>11/30/2021</a:t>
             </a:fld>
             <a:endParaRPr lang="en-US"/>
           </a:p>
@@ -3522,7 +3527,7 @@
           <a:p>
             <a:fld id="{12F13438-500E-4236-BBEA-EC67F23236E9}" type="datetimeFigureOut">
               <a:rPr lang="en-US" smtClean="0"/>
-              <a:t>11/29/2021</a:t>
+              <a:t>11/30/2021</a:t>
             </a:fld>
             <a:endParaRPr lang="en-US"/>
           </a:p>
@@ -4110,8 +4115,8 @@
           </a:p>
         </p:txBody>
       </p:sp>
-      <mc:AlternateContent xmlns:mc="http://schemas.openxmlformats.org/markup-compatibility/2006">
-        <mc:Choice xmlns:p14="http://schemas.microsoft.com/office/powerpoint/2010/main" Requires="p14">
+      <mc:AlternateContent xmlns:mc="http://schemas.openxmlformats.org/markup-compatibility/2006" xmlns:p14="http://schemas.microsoft.com/office/powerpoint/2010/main">
+        <mc:Choice Requires="p14">
           <p:contentPart p14:bwMode="auto" r:id="rId2">
             <p14:nvContentPartPr>
               <p14:cNvPr id="14" name="Ink 13">
@@ -4130,7 +4135,7 @@
             </p14:xfrm>
           </p:contentPart>
         </mc:Choice>
-        <mc:Fallback>
+        <mc:Fallback xmlns="">
           <p:pic>
             <p:nvPicPr>
               <p:cNvPr id="14" name="Ink 13">
@@ -4989,15 +4994,33 @@
                                   </p:childTnLst>
                                 </p:cTn>
                               </p:par>
+                            </p:childTnLst>
+                          </p:cTn>
+                        </p:par>
+                      </p:childTnLst>
+                    </p:cTn>
+                  </p:par>
+                  <p:par>
+                    <p:cTn id="9" fill="hold">
+                      <p:stCondLst>
+                        <p:cond delay="indefinite"/>
+                      </p:stCondLst>
+                      <p:childTnLst>
+                        <p:par>
+                          <p:cTn id="10" fill="hold">
+                            <p:stCondLst>
+                              <p:cond delay="0"/>
+                            </p:stCondLst>
+                            <p:childTnLst>
                               <p:par>
-                                <p:cTn id="9" presetID="1" presetClass="entr" presetSubtype="0" fill="hold" nodeType="withEffect">
+                                <p:cTn id="11" presetID="1" presetClass="entr" presetSubtype="0" fill="hold" nodeType="clickEffect">
                                   <p:stCondLst>
                                     <p:cond delay="0"/>
                                   </p:stCondLst>
                                   <p:childTnLst>
                                     <p:set>
                                       <p:cBhvr>
-                                        <p:cTn id="10" dur="1" fill="hold">
+                                        <p:cTn id="12" dur="1" fill="hold">
                                           <p:stCondLst>
                                             <p:cond delay="0"/>
                                           </p:stCondLst>
@@ -5020,15 +5043,33 @@
                                   </p:childTnLst>
                                 </p:cTn>
                               </p:par>
+                            </p:childTnLst>
+                          </p:cTn>
+                        </p:par>
+                      </p:childTnLst>
+                    </p:cTn>
+                  </p:par>
+                  <p:par>
+                    <p:cTn id="13" fill="hold">
+                      <p:stCondLst>
+                        <p:cond delay="indefinite"/>
+                      </p:stCondLst>
+                      <p:childTnLst>
+                        <p:par>
+                          <p:cTn id="14" fill="hold">
+                            <p:stCondLst>
+                              <p:cond delay="0"/>
+                            </p:stCondLst>
+                            <p:childTnLst>
                               <p:par>
-                                <p:cTn id="11" presetID="1" presetClass="entr" presetSubtype="0" fill="hold" nodeType="withEffect">
+                                <p:cTn id="15" presetID="1" presetClass="entr" presetSubtype="0" fill="hold" nodeType="clickEffect">
                                   <p:stCondLst>
                                     <p:cond delay="0"/>
                                   </p:stCondLst>
                                   <p:childTnLst>
                                     <p:set>
                                       <p:cBhvr>
-                                        <p:cTn id="12" dur="1" fill="hold">
+                                        <p:cTn id="16" dur="1" fill="hold">
                                           <p:stCondLst>
                                             <p:cond delay="0"/>
                                           </p:stCondLst>
@@ -5051,15 +5092,33 @@
                                   </p:childTnLst>
                                 </p:cTn>
                               </p:par>
+                            </p:childTnLst>
+                          </p:cTn>
+                        </p:par>
+                      </p:childTnLst>
+                    </p:cTn>
+                  </p:par>
+                  <p:par>
+                    <p:cTn id="17" fill="hold">
+                      <p:stCondLst>
+                        <p:cond delay="indefinite"/>
+                      </p:stCondLst>
+                      <p:childTnLst>
+                        <p:par>
+                          <p:cTn id="18" fill="hold">
+                            <p:stCondLst>
+                              <p:cond delay="0"/>
+                            </p:stCondLst>
+                            <p:childTnLst>
                               <p:par>
-                                <p:cTn id="13" presetID="1" presetClass="entr" presetSubtype="0" fill="hold" nodeType="withEffect">
+                                <p:cTn id="19" presetID="1" presetClass="entr" presetSubtype="0" fill="hold" nodeType="clickEffect">
                                   <p:stCondLst>
                                     <p:cond delay="0"/>
                                   </p:stCondLst>
                                   <p:childTnLst>
                                     <p:set>
                                       <p:cBhvr>
-                                        <p:cTn id="14" dur="1" fill="hold">
+                                        <p:cTn id="20" dur="1" fill="hold">
                                           <p:stCondLst>
                                             <p:cond delay="0"/>
                                           </p:stCondLst>
@@ -5082,15 +5141,33 @@
                                   </p:childTnLst>
                                 </p:cTn>
                               </p:par>
+                            </p:childTnLst>
+                          </p:cTn>
+                        </p:par>
+                      </p:childTnLst>
+                    </p:cTn>
+                  </p:par>
+                  <p:par>
+                    <p:cTn id="21" fill="hold">
+                      <p:stCondLst>
+                        <p:cond delay="indefinite"/>
+                      </p:stCondLst>
+                      <p:childTnLst>
+                        <p:par>
+                          <p:cTn id="22" fill="hold">
+                            <p:stCondLst>
+                              <p:cond delay="0"/>
+                            </p:stCondLst>
+                            <p:childTnLst>
                               <p:par>
-                                <p:cTn id="15" presetID="1" presetClass="entr" presetSubtype="0" fill="hold" nodeType="withEffect">
+                                <p:cTn id="23" presetID="1" presetClass="entr" presetSubtype="0" fill="hold" nodeType="clickEffect">
                                   <p:stCondLst>
                                     <p:cond delay="0"/>
                                   </p:stCondLst>
                                   <p:childTnLst>
                                     <p:set>
                                       <p:cBhvr>
-                                        <p:cTn id="16" dur="1" fill="hold">
+                                        <p:cTn id="24" dur="1" fill="hold">
                                           <p:stCondLst>
                                             <p:cond delay="0"/>
                                           </p:stCondLst>
@@ -5114,14 +5191,14 @@
                                 </p:cTn>
                               </p:par>
                               <p:par>
-                                <p:cTn id="17" presetID="1" presetClass="entr" presetSubtype="0" fill="hold" nodeType="withEffect">
+                                <p:cTn id="25" presetID="1" presetClass="entr" presetSubtype="0" fill="hold" nodeType="withEffect">
                                   <p:stCondLst>
                                     <p:cond delay="0"/>
                                   </p:stCondLst>
                                   <p:childTnLst>
                                     <p:set>
                                       <p:cBhvr>
-                                        <p:cTn id="18" dur="1" fill="hold">
+                                        <p:cTn id="26" dur="1" fill="hold">
                                           <p:stCondLst>
                                             <p:cond delay="0"/>
                                           </p:stCondLst>
@@ -5144,15 +5221,33 @@
                                   </p:childTnLst>
                                 </p:cTn>
                               </p:par>
+                            </p:childTnLst>
+                          </p:cTn>
+                        </p:par>
+                      </p:childTnLst>
+                    </p:cTn>
+                  </p:par>
+                  <p:par>
+                    <p:cTn id="27" fill="hold">
+                      <p:stCondLst>
+                        <p:cond delay="indefinite"/>
+                      </p:stCondLst>
+                      <p:childTnLst>
+                        <p:par>
+                          <p:cTn id="28" fill="hold">
+                            <p:stCondLst>
+                              <p:cond delay="0"/>
+                            </p:stCondLst>
+                            <p:childTnLst>
                               <p:par>
-                                <p:cTn id="19" presetID="1" presetClass="entr" presetSubtype="0" fill="hold" nodeType="withEffect">
+                                <p:cTn id="29" presetID="1" presetClass="entr" presetSubtype="0" fill="hold" nodeType="clickEffect">
                                   <p:stCondLst>
                                     <p:cond delay="0"/>
                                   </p:stCondLst>
                                   <p:childTnLst>
                                     <p:set>
                                       <p:cBhvr>
-                                        <p:cTn id="20" dur="1" fill="hold">
+                                        <p:cTn id="30" dur="1" fill="hold">
                                           <p:stCondLst>
                                             <p:cond delay="0"/>
                                           </p:stCondLst>
@@ -5176,14 +5271,14 @@
                                 </p:cTn>
                               </p:par>
                               <p:par>
-                                <p:cTn id="21" presetID="1" presetClass="entr" presetSubtype="0" fill="hold" nodeType="withEffect">
+                                <p:cTn id="31" presetID="1" presetClass="entr" presetSubtype="0" fill="hold" nodeType="withEffect">
                                   <p:stCondLst>
                                     <p:cond delay="0"/>
                                   </p:stCondLst>
                                   <p:childTnLst>
                                     <p:set>
                                       <p:cBhvr>
-                                        <p:cTn id="22" dur="1" fill="hold">
+                                        <p:cTn id="32" dur="1" fill="hold">
                                           <p:stCondLst>
                                             <p:cond delay="0"/>
                                           </p:stCondLst>
@@ -5207,14 +5302,14 @@
                                 </p:cTn>
                               </p:par>
                               <p:par>
-                                <p:cTn id="23" presetID="1" presetClass="entr" presetSubtype="0" fill="hold" nodeType="withEffect">
+                                <p:cTn id="33" presetID="1" presetClass="entr" presetSubtype="0" fill="hold" nodeType="withEffect">
                                   <p:stCondLst>
                                     <p:cond delay="0"/>
                                   </p:stCondLst>
                                   <p:childTnLst>
                                     <p:set>
                                       <p:cBhvr>
-                                        <p:cTn id="24" dur="1" fill="hold">
+                                        <p:cTn id="34" dur="1" fill="hold">
                                           <p:stCondLst>
                                             <p:cond delay="0"/>
                                           </p:stCondLst>
@@ -5326,8 +5421,8 @@
           </a:p>
         </p:txBody>
       </p:sp>
-      <mc:AlternateContent xmlns:mc="http://schemas.openxmlformats.org/markup-compatibility/2006">
-        <mc:Choice xmlns:p14="http://schemas.microsoft.com/office/powerpoint/2010/main" Requires="p14">
+      <mc:AlternateContent xmlns:mc="http://schemas.openxmlformats.org/markup-compatibility/2006" xmlns:p14="http://schemas.microsoft.com/office/powerpoint/2010/main">
+        <mc:Choice Requires="p14">
           <p:contentPart p14:bwMode="auto" r:id="rId2">
             <p14:nvContentPartPr>
               <p14:cNvPr id="14" name="Ink 13">
@@ -5346,7 +5441,7 @@
             </p14:xfrm>
           </p:contentPart>
         </mc:Choice>
-        <mc:Fallback>
+        <mc:Fallback xmlns="">
           <p:pic>
             <p:nvPicPr>
               <p:cNvPr id="14" name="Ink 13">
@@ -8783,8 +8878,8 @@
           </a:p>
         </p:txBody>
       </p:sp>
-      <mc:AlternateContent xmlns:mc="http://schemas.openxmlformats.org/markup-compatibility/2006">
-        <mc:Choice xmlns:p14="http://schemas.microsoft.com/office/powerpoint/2010/main" Requires="p14">
+      <mc:AlternateContent xmlns:mc="http://schemas.openxmlformats.org/markup-compatibility/2006" xmlns:p14="http://schemas.microsoft.com/office/powerpoint/2010/main">
+        <mc:Choice Requires="p14">
           <p:contentPart p14:bwMode="auto" r:id="rId4">
             <p14:nvContentPartPr>
               <p14:cNvPr id="14" name="Ink 13">
@@ -8803,7 +8898,7 @@
             </p14:xfrm>
           </p:contentPart>
         </mc:Choice>
-        <mc:Fallback>
+        <mc:Fallback xmlns="">
           <p:pic>
             <p:nvPicPr>
               <p:cNvPr id="14" name="Ink 13">
@@ -10032,8 +10127,8 @@
           </a:p>
         </p:txBody>
       </p:sp>
-      <mc:AlternateContent xmlns:mc="http://schemas.openxmlformats.org/markup-compatibility/2006">
-        <mc:Choice xmlns:p14="http://schemas.microsoft.com/office/powerpoint/2010/main" Requires="p14">
+      <mc:AlternateContent xmlns:mc="http://schemas.openxmlformats.org/markup-compatibility/2006" xmlns:p14="http://schemas.microsoft.com/office/powerpoint/2010/main">
+        <mc:Choice Requires="p14">
           <p:contentPart p14:bwMode="auto" r:id="rId2">
             <p14:nvContentPartPr>
               <p14:cNvPr id="14" name="Ink 13">
@@ -10052,7 +10147,7 @@
             </p14:xfrm>
           </p:contentPart>
         </mc:Choice>
-        <mc:Fallback>
+        <mc:Fallback xmlns="">
           <p:pic>
             <p:nvPicPr>
               <p:cNvPr id="14" name="Ink 13">
@@ -11224,8 +11319,8 @@
           </a:p>
         </p:txBody>
       </p:sp>
-      <mc:AlternateContent xmlns:mc="http://schemas.openxmlformats.org/markup-compatibility/2006">
-        <mc:Choice xmlns:p14="http://schemas.microsoft.com/office/powerpoint/2010/main" Requires="p14">
+      <mc:AlternateContent xmlns:mc="http://schemas.openxmlformats.org/markup-compatibility/2006" xmlns:p14="http://schemas.microsoft.com/office/powerpoint/2010/main">
+        <mc:Choice Requires="p14">
           <p:contentPart p14:bwMode="auto" r:id="rId2">
             <p14:nvContentPartPr>
               <p14:cNvPr id="14" name="Ink 13">
@@ -11244,7 +11339,7 @@
             </p14:xfrm>
           </p:contentPart>
         </mc:Choice>
-        <mc:Fallback>
+        <mc:Fallback xmlns="">
           <p:pic>
             <p:nvPicPr>
               <p:cNvPr id="14" name="Ink 13">

</xml_diff>